<commit_message>
Added copyright to some slides.
</commit_message>
<xml_diff>
--- a/Day 1/000 - Machine Learning Pipelines/machine-learning-pipelines-lecture-v1.0.pptx
+++ b/Day 1/000 - Machine Learning Pipelines/machine-learning-pipelines-lecture-v1.0.pptx
@@ -3718,7 +3718,7 @@
           <a:p>
             <a:fld id="{4A825FCE-BE6A-CC4A-B6FA-22ABE045C7F5}" type="datetimeFigureOut">
               <a:rPr lang="en-CH" smtClean="0"/>
-              <a:t>04.02.2024</a:t>
+              <a:t>01.09.2024</a:t>
             </a:fld>
             <a:endParaRPr lang="en-CH"/>
           </a:p>
@@ -3918,7 +3918,7 @@
           <a:p>
             <a:fld id="{4A825FCE-BE6A-CC4A-B6FA-22ABE045C7F5}" type="datetimeFigureOut">
               <a:rPr lang="en-CH" smtClean="0"/>
-              <a:t>04.02.2024</a:t>
+              <a:t>01.09.2024</a:t>
             </a:fld>
             <a:endParaRPr lang="en-CH"/>
           </a:p>
@@ -4128,7 +4128,7 @@
           <a:p>
             <a:fld id="{4A825FCE-BE6A-CC4A-B6FA-22ABE045C7F5}" type="datetimeFigureOut">
               <a:rPr lang="en-CH" smtClean="0"/>
-              <a:t>04.02.2024</a:t>
+              <a:t>01.09.2024</a:t>
             </a:fld>
             <a:endParaRPr lang="en-CH"/>
           </a:p>
@@ -4328,7 +4328,7 @@
           <a:p>
             <a:fld id="{4A825FCE-BE6A-CC4A-B6FA-22ABE045C7F5}" type="datetimeFigureOut">
               <a:rPr lang="en-CH" smtClean="0"/>
-              <a:t>04.02.2024</a:t>
+              <a:t>01.09.2024</a:t>
             </a:fld>
             <a:endParaRPr lang="en-CH"/>
           </a:p>
@@ -4604,7 +4604,7 @@
           <a:p>
             <a:fld id="{4A825FCE-BE6A-CC4A-B6FA-22ABE045C7F5}" type="datetimeFigureOut">
               <a:rPr lang="en-CH" smtClean="0"/>
-              <a:t>04.02.2024</a:t>
+              <a:t>01.09.2024</a:t>
             </a:fld>
             <a:endParaRPr lang="en-CH"/>
           </a:p>
@@ -4872,7 +4872,7 @@
           <a:p>
             <a:fld id="{4A825FCE-BE6A-CC4A-B6FA-22ABE045C7F5}" type="datetimeFigureOut">
               <a:rPr lang="en-CH" smtClean="0"/>
-              <a:t>04.02.2024</a:t>
+              <a:t>01.09.2024</a:t>
             </a:fld>
             <a:endParaRPr lang="en-CH"/>
           </a:p>
@@ -5287,7 +5287,7 @@
           <a:p>
             <a:fld id="{4A825FCE-BE6A-CC4A-B6FA-22ABE045C7F5}" type="datetimeFigureOut">
               <a:rPr lang="en-CH" smtClean="0"/>
-              <a:t>04.02.2024</a:t>
+              <a:t>01.09.2024</a:t>
             </a:fld>
             <a:endParaRPr lang="en-CH"/>
           </a:p>
@@ -5429,7 +5429,7 @@
           <a:p>
             <a:fld id="{4A825FCE-BE6A-CC4A-B6FA-22ABE045C7F5}" type="datetimeFigureOut">
               <a:rPr lang="en-CH" smtClean="0"/>
-              <a:t>04.02.2024</a:t>
+              <a:t>01.09.2024</a:t>
             </a:fld>
             <a:endParaRPr lang="en-CH"/>
           </a:p>
@@ -5542,7 +5542,7 @@
           <a:p>
             <a:fld id="{4A825FCE-BE6A-CC4A-B6FA-22ABE045C7F5}" type="datetimeFigureOut">
               <a:rPr lang="en-CH" smtClean="0"/>
-              <a:t>04.02.2024</a:t>
+              <a:t>01.09.2024</a:t>
             </a:fld>
             <a:endParaRPr lang="en-CH"/>
           </a:p>
@@ -5855,7 +5855,7 @@
           <a:p>
             <a:fld id="{4A825FCE-BE6A-CC4A-B6FA-22ABE045C7F5}" type="datetimeFigureOut">
               <a:rPr lang="en-CH" smtClean="0"/>
-              <a:t>04.02.2024</a:t>
+              <a:t>01.09.2024</a:t>
             </a:fld>
             <a:endParaRPr lang="en-CH"/>
           </a:p>
@@ -6144,7 +6144,7 @@
           <a:p>
             <a:fld id="{4A825FCE-BE6A-CC4A-B6FA-22ABE045C7F5}" type="datetimeFigureOut">
               <a:rPr lang="en-CH" smtClean="0"/>
-              <a:t>04.02.2024</a:t>
+              <a:t>01.09.2024</a:t>
             </a:fld>
             <a:endParaRPr lang="en-CH"/>
           </a:p>
@@ -6389,7 +6389,7 @@
             <a:fld id="{4A825FCE-BE6A-CC4A-B6FA-22ABE045C7F5}" type="datetimeFigureOut">
               <a:rPr lang="en-CH" smtClean="0"/>
               <a:pPr/>
-              <a:t>04.02.2024</a:t>
+              <a:t>01.09.2024</a:t>
             </a:fld>
             <a:endParaRPr lang="en-CH" dirty="0"/>
           </a:p>
@@ -6883,6 +6883,94 @@
           </a:p>
         </p:txBody>
       </p:sp>
+      <p:sp>
+        <p:nvSpPr>
+          <p:cNvPr id="4" name="TextBox 3">
+            <a:extLst>
+              <a:ext uri="{FF2B5EF4-FFF2-40B4-BE49-F238E27FC236}">
+                <a16:creationId xmlns:a16="http://schemas.microsoft.com/office/drawing/2014/main" id="{5660105D-C157-CAF7-6454-78A42FD81442}"/>
+              </a:ext>
+            </a:extLst>
+          </p:cNvPr>
+          <p:cNvSpPr txBox="1"/>
+          <p:nvPr/>
+        </p:nvSpPr>
+        <p:spPr>
+          <a:xfrm>
+            <a:off x="1748444" y="6596390"/>
+            <a:ext cx="8695112" cy="261610"/>
+          </a:xfrm>
+          <a:prstGeom prst="rect">
+            <a:avLst/>
+          </a:prstGeom>
+          <a:noFill/>
+        </p:spPr>
+        <p:txBody>
+          <a:bodyPr wrap="square">
+            <a:spAutoFit/>
+          </a:bodyPr>
+          <a:lstStyle/>
+          <a:p>
+            <a:pPr algn="ctr">
+              <a:spcBef>
+                <a:spcPts val="0"/>
+              </a:spcBef>
+            </a:pPr>
+            <a:r>
+              <a:rPr lang="en-GB" sz="1100" dirty="0">
+                <a:solidFill>
+                  <a:schemeClr val="bg2">
+                    <a:lumMod val="75000"/>
+                  </a:schemeClr>
+                </a:solidFill>
+                <a:latin typeface="Arial" panose="020B0604020202020204" pitchFamily="34" charset="0"/>
+              </a:rPr>
+              <a:t>© </a:t>
+            </a:r>
+            <a:r>
+              <a:rPr lang="en-GB" sz="1100" dirty="0" err="1">
+                <a:solidFill>
+                  <a:schemeClr val="bg2">
+                    <a:lumMod val="75000"/>
+                  </a:schemeClr>
+                </a:solidFill>
+                <a:latin typeface="Arial" panose="020B0604020202020204" pitchFamily="34" charset="0"/>
+              </a:rPr>
+              <a:t>Dr.</a:t>
+            </a:r>
+            <a:r>
+              <a:rPr lang="en-GB" sz="1100" dirty="0">
+                <a:solidFill>
+                  <a:schemeClr val="bg2">
+                    <a:lumMod val="75000"/>
+                  </a:schemeClr>
+                </a:solidFill>
+                <a:latin typeface="Arial" panose="020B0604020202020204" pitchFamily="34" charset="0"/>
+              </a:rPr>
+              <a:t> U. Michelucci – </a:t>
+            </a:r>
+            <a:r>
+              <a:rPr lang="en-GB" sz="1100" dirty="0" err="1">
+                <a:solidFill>
+                  <a:schemeClr val="bg2">
+                    <a:lumMod val="75000"/>
+                  </a:schemeClr>
+                </a:solidFill>
+                <a:latin typeface="Arial" panose="020B0604020202020204" pitchFamily="34" charset="0"/>
+              </a:rPr>
+              <a:t>umberto.Michelucci@hslu.ch</a:t>
+            </a:r>
+            <a:endParaRPr lang="en-GB" sz="1100" dirty="0">
+              <a:solidFill>
+                <a:schemeClr val="bg2">
+                  <a:lumMod val="75000"/>
+                </a:schemeClr>
+              </a:solidFill>
+              <a:latin typeface="Arial" panose="020B0604020202020204" pitchFamily="34" charset="0"/>
+            </a:endParaRPr>
+          </a:p>
+        </p:txBody>
+      </p:sp>
     </p:spTree>
     <p:extLst>
       <p:ext uri="{BB962C8B-B14F-4D97-AF65-F5344CB8AC3E}">
@@ -6975,6 +7063,94 @@
           </a:graphicData>
         </a:graphic>
       </p:graphicFrame>
+      <p:sp>
+        <p:nvSpPr>
+          <p:cNvPr id="3" name="TextBox 2">
+            <a:extLst>
+              <a:ext uri="{FF2B5EF4-FFF2-40B4-BE49-F238E27FC236}">
+                <a16:creationId xmlns:a16="http://schemas.microsoft.com/office/drawing/2014/main" id="{25A502AC-883E-811C-0115-5BA25BECA5EE}"/>
+              </a:ext>
+            </a:extLst>
+          </p:cNvPr>
+          <p:cNvSpPr txBox="1"/>
+          <p:nvPr/>
+        </p:nvSpPr>
+        <p:spPr>
+          <a:xfrm>
+            <a:off x="1748444" y="6596390"/>
+            <a:ext cx="8695112" cy="261610"/>
+          </a:xfrm>
+          <a:prstGeom prst="rect">
+            <a:avLst/>
+          </a:prstGeom>
+          <a:noFill/>
+        </p:spPr>
+        <p:txBody>
+          <a:bodyPr wrap="square">
+            <a:spAutoFit/>
+          </a:bodyPr>
+          <a:lstStyle/>
+          <a:p>
+            <a:pPr algn="ctr">
+              <a:spcBef>
+                <a:spcPts val="0"/>
+              </a:spcBef>
+            </a:pPr>
+            <a:r>
+              <a:rPr lang="en-GB" sz="1100" dirty="0">
+                <a:solidFill>
+                  <a:schemeClr val="bg2">
+                    <a:lumMod val="75000"/>
+                  </a:schemeClr>
+                </a:solidFill>
+                <a:latin typeface="Arial" panose="020B0604020202020204" pitchFamily="34" charset="0"/>
+              </a:rPr>
+              <a:t>© </a:t>
+            </a:r>
+            <a:r>
+              <a:rPr lang="en-GB" sz="1100" dirty="0" err="1">
+                <a:solidFill>
+                  <a:schemeClr val="bg2">
+                    <a:lumMod val="75000"/>
+                  </a:schemeClr>
+                </a:solidFill>
+                <a:latin typeface="Arial" panose="020B0604020202020204" pitchFamily="34" charset="0"/>
+              </a:rPr>
+              <a:t>Dr.</a:t>
+            </a:r>
+            <a:r>
+              <a:rPr lang="en-GB" sz="1100" dirty="0">
+                <a:solidFill>
+                  <a:schemeClr val="bg2">
+                    <a:lumMod val="75000"/>
+                  </a:schemeClr>
+                </a:solidFill>
+                <a:latin typeface="Arial" panose="020B0604020202020204" pitchFamily="34" charset="0"/>
+              </a:rPr>
+              <a:t> U. Michelucci – </a:t>
+            </a:r>
+            <a:r>
+              <a:rPr lang="en-GB" sz="1100" dirty="0" err="1">
+                <a:solidFill>
+                  <a:schemeClr val="bg2">
+                    <a:lumMod val="75000"/>
+                  </a:schemeClr>
+                </a:solidFill>
+                <a:latin typeface="Arial" panose="020B0604020202020204" pitchFamily="34" charset="0"/>
+              </a:rPr>
+              <a:t>umberto.Michelucci@hslu.ch</a:t>
+            </a:r>
+            <a:endParaRPr lang="en-GB" sz="1100" dirty="0">
+              <a:solidFill>
+                <a:schemeClr val="bg2">
+                  <a:lumMod val="75000"/>
+                </a:schemeClr>
+              </a:solidFill>
+              <a:latin typeface="Arial" panose="020B0604020202020204" pitchFamily="34" charset="0"/>
+            </a:endParaRPr>
+          </a:p>
+        </p:txBody>
+      </p:sp>
     </p:spTree>
     <p:extLst>
       <p:ext uri="{BB962C8B-B14F-4D97-AF65-F5344CB8AC3E}">
@@ -7163,6 +7339,94 @@
               <a:rPr lang="en-CH" dirty="0"/>
               <a:t>Research Questions Formulation</a:t>
             </a:r>
+          </a:p>
+        </p:txBody>
+      </p:sp>
+      <p:sp>
+        <p:nvSpPr>
+          <p:cNvPr id="3" name="TextBox 2">
+            <a:extLst>
+              <a:ext uri="{FF2B5EF4-FFF2-40B4-BE49-F238E27FC236}">
+                <a16:creationId xmlns:a16="http://schemas.microsoft.com/office/drawing/2014/main" id="{0A016A1B-96D2-4C8D-5C73-488FF618F3E5}"/>
+              </a:ext>
+            </a:extLst>
+          </p:cNvPr>
+          <p:cNvSpPr txBox="1"/>
+          <p:nvPr/>
+        </p:nvSpPr>
+        <p:spPr>
+          <a:xfrm>
+            <a:off x="1748444" y="6596390"/>
+            <a:ext cx="8695112" cy="261610"/>
+          </a:xfrm>
+          <a:prstGeom prst="rect">
+            <a:avLst/>
+          </a:prstGeom>
+          <a:noFill/>
+        </p:spPr>
+        <p:txBody>
+          <a:bodyPr wrap="square">
+            <a:spAutoFit/>
+          </a:bodyPr>
+          <a:lstStyle/>
+          <a:p>
+            <a:pPr algn="ctr">
+              <a:spcBef>
+                <a:spcPts val="0"/>
+              </a:spcBef>
+            </a:pPr>
+            <a:r>
+              <a:rPr lang="en-GB" sz="1100" dirty="0">
+                <a:solidFill>
+                  <a:schemeClr val="bg2">
+                    <a:lumMod val="75000"/>
+                  </a:schemeClr>
+                </a:solidFill>
+                <a:latin typeface="Arial" panose="020B0604020202020204" pitchFamily="34" charset="0"/>
+              </a:rPr>
+              <a:t>© </a:t>
+            </a:r>
+            <a:r>
+              <a:rPr lang="en-GB" sz="1100" dirty="0" err="1">
+                <a:solidFill>
+                  <a:schemeClr val="bg2">
+                    <a:lumMod val="75000"/>
+                  </a:schemeClr>
+                </a:solidFill>
+                <a:latin typeface="Arial" panose="020B0604020202020204" pitchFamily="34" charset="0"/>
+              </a:rPr>
+              <a:t>Dr.</a:t>
+            </a:r>
+            <a:r>
+              <a:rPr lang="en-GB" sz="1100" dirty="0">
+                <a:solidFill>
+                  <a:schemeClr val="bg2">
+                    <a:lumMod val="75000"/>
+                  </a:schemeClr>
+                </a:solidFill>
+                <a:latin typeface="Arial" panose="020B0604020202020204" pitchFamily="34" charset="0"/>
+              </a:rPr>
+              <a:t> U. Michelucci – </a:t>
+            </a:r>
+            <a:r>
+              <a:rPr lang="en-GB" sz="1100" dirty="0" err="1">
+                <a:solidFill>
+                  <a:schemeClr val="bg2">
+                    <a:lumMod val="75000"/>
+                  </a:schemeClr>
+                </a:solidFill>
+                <a:latin typeface="Arial" panose="020B0604020202020204" pitchFamily="34" charset="0"/>
+              </a:rPr>
+              <a:t>umberto.Michelucci@hslu.ch</a:t>
+            </a:r>
+            <a:endParaRPr lang="en-GB" sz="1100" dirty="0">
+              <a:solidFill>
+                <a:schemeClr val="bg2">
+                  <a:lumMod val="75000"/>
+                </a:schemeClr>
+              </a:solidFill>
+              <a:latin typeface="Arial" panose="020B0604020202020204" pitchFamily="34" charset="0"/>
+            </a:endParaRPr>
           </a:p>
         </p:txBody>
       </p:sp>

</xml_diff>